<commit_message>
Upload Vulkan study file for Chapter 1, Part 1
</commit_message>
<xml_diff>
--- a/Vulkan - Chapter 1, Part 1.pptx
+++ b/Vulkan - Chapter 1, Part 1.pptx
@@ -5,10 +5,10 @@
     <p:sldMasterId id="2147483672" r:id="rId1"/>
   </p:sldMasterIdLst>
   <p:notesMasterIdLst>
-    <p:notesMasterId r:id="rId10"/>
+    <p:notesMasterId r:id="rId13"/>
   </p:notesMasterIdLst>
   <p:handoutMasterIdLst>
-    <p:handoutMasterId r:id="rId11"/>
+    <p:handoutMasterId r:id="rId14"/>
   </p:handoutMasterIdLst>
   <p:sldIdLst>
     <p:sldId id="329" r:id="rId2"/>
@@ -19,37 +19,40 @@
     <p:sldId id="381" r:id="rId7"/>
     <p:sldId id="383" r:id="rId8"/>
     <p:sldId id="384" r:id="rId9"/>
+    <p:sldId id="385" r:id="rId10"/>
+    <p:sldId id="386" r:id="rId11"/>
+    <p:sldId id="387" r:id="rId12"/>
   </p:sldIdLst>
   <p:sldSz cx="12192000" cy="6858000"/>
   <p:notesSz cx="6858000" cy="9144000"/>
   <p:embeddedFontLst>
     <p:embeddedFont>
+      <p:font typeface="서울남산체 M" panose="02020503020101020101" pitchFamily="18" charset="-127"/>
+      <p:regular r:id="rId15"/>
+    </p:embeddedFont>
+    <p:embeddedFont>
       <p:font typeface="Segoe UI" panose="020B0502040204020203" pitchFamily="34" charset="0"/>
-      <p:regular r:id="rId12"/>
-      <p:bold r:id="rId13"/>
-      <p:italic r:id="rId14"/>
-      <p:boldItalic r:id="rId15"/>
+      <p:regular r:id="rId16"/>
+      <p:bold r:id="rId17"/>
+      <p:italic r:id="rId18"/>
+      <p:boldItalic r:id="rId19"/>
     </p:embeddedFont>
     <p:embeddedFont>
       <p:font typeface="Segoe UI Light" panose="020B0502040204020203" pitchFamily="34" charset="0"/>
-      <p:regular r:id="rId16"/>
-      <p:italic r:id="rId17"/>
+      <p:regular r:id="rId20"/>
+      <p:italic r:id="rId21"/>
     </p:embeddedFont>
     <p:embeddedFont>
       <p:font typeface="Calibri" panose="020F0502020204030204" pitchFamily="34" charset="0"/>
-      <p:regular r:id="rId18"/>
-      <p:bold r:id="rId19"/>
-      <p:italic r:id="rId20"/>
-      <p:boldItalic r:id="rId21"/>
+      <p:regular r:id="rId22"/>
+      <p:bold r:id="rId23"/>
+      <p:italic r:id="rId24"/>
+      <p:boldItalic r:id="rId25"/>
     </p:embeddedFont>
     <p:embeddedFont>
       <p:font typeface="맑은 고딕" panose="020B0503020000020004" pitchFamily="34" charset="-127"/>
-      <p:regular r:id="rId22"/>
-      <p:bold r:id="rId23"/>
-    </p:embeddedFont>
-    <p:embeddedFont>
-      <p:font typeface="서울남산체 M" panose="02020503020101020101" pitchFamily="18" charset="-127"/>
-      <p:regular r:id="rId24"/>
+      <p:regular r:id="rId26"/>
+      <p:bold r:id="rId27"/>
     </p:embeddedFont>
   </p:embeddedFontLst>
   <p:defaultTextStyle>
@@ -251,7 +254,7 @@
           <a:p>
             <a:fld id="{9476D1C5-1084-402D-85B0-DF3E2A452BD1}" type="datetimeFigureOut">
               <a:rPr lang="ko-KR" altLang="en-US" smtClean="0"/>
-              <a:t>2018-03-05</a:t>
+              <a:t>2018-03-06</a:t>
             </a:fld>
             <a:endParaRPr lang="ko-KR" altLang="en-US"/>
           </a:p>
@@ -416,7 +419,7 @@
           <a:p>
             <a:fld id="{931411E2-7637-42C8-8B47-ACDEF4E701D2}" type="datetimeFigureOut">
               <a:rPr lang="en-US" smtClean="0"/>
-              <a:t>3/5/2018</a:t>
+              <a:t>3/6/2018</a:t>
             </a:fld>
             <a:endParaRPr lang="en-US"/>
           </a:p>
@@ -767,6 +770,174 @@
 </p:notes>
 </file>
 
+<file path=ppt/notesSlides/notesSlide10.xml><?xml version="1.0" encoding="utf-8"?>
+<p:notes xmlns:a="http://schemas.openxmlformats.org/drawingml/2006/main" xmlns:r="http://schemas.openxmlformats.org/officeDocument/2006/relationships" xmlns:p="http://schemas.openxmlformats.org/presentationml/2006/main">
+  <p:cSld>
+    <p:spTree>
+      <p:nvGrpSpPr>
+        <p:cNvPr id="1" name=""/>
+        <p:cNvGrpSpPr/>
+        <p:nvPr/>
+      </p:nvGrpSpPr>
+      <p:grpSpPr>
+        <a:xfrm>
+          <a:off x="0" y="0"/>
+          <a:ext cx="0" cy="0"/>
+          <a:chOff x="0" y="0"/>
+          <a:chExt cx="0" cy="0"/>
+        </a:xfrm>
+      </p:grpSpPr>
+      <p:sp>
+        <p:nvSpPr>
+          <p:cNvPr id="2" name="Slide Image Placeholder 1"/>
+          <p:cNvSpPr>
+            <a:spLocks noGrp="1" noRot="1" noChangeAspect="1"/>
+          </p:cNvSpPr>
+          <p:nvPr>
+            <p:ph type="sldImg"/>
+          </p:nvPr>
+        </p:nvSpPr>
+        <p:spPr/>
+      </p:sp>
+      <p:sp>
+        <p:nvSpPr>
+          <p:cNvPr id="3" name="Notes Placeholder 2"/>
+          <p:cNvSpPr>
+            <a:spLocks noGrp="1"/>
+          </p:cNvSpPr>
+          <p:nvPr>
+            <p:ph type="body" idx="1"/>
+          </p:nvPr>
+        </p:nvSpPr>
+        <p:spPr/>
+        <p:txBody>
+          <a:bodyPr/>
+          <a:lstStyle/>
+          <a:p>
+            <a:endParaRPr lang="en-US"/>
+          </a:p>
+        </p:txBody>
+      </p:sp>
+      <p:sp>
+        <p:nvSpPr>
+          <p:cNvPr id="4" name="Slide Number Placeholder 3"/>
+          <p:cNvSpPr>
+            <a:spLocks noGrp="1"/>
+          </p:cNvSpPr>
+          <p:nvPr>
+            <p:ph type="sldNum" sz="quarter" idx="10"/>
+          </p:nvPr>
+        </p:nvSpPr>
+        <p:spPr/>
+        <p:txBody>
+          <a:bodyPr/>
+          <a:lstStyle/>
+          <a:p>
+            <a:fld id="{80E5F7B1-A22B-4383-89B4-FA12AEED286C}" type="slidenum">
+              <a:rPr lang="en-US" smtClean="0"/>
+              <a:t>10</a:t>
+            </a:fld>
+            <a:endParaRPr lang="en-US"/>
+          </a:p>
+        </p:txBody>
+      </p:sp>
+    </p:spTree>
+    <p:extLst>
+      <p:ext uri="{BB962C8B-B14F-4D97-AF65-F5344CB8AC3E}">
+        <p14:creationId xmlns:p14="http://schemas.microsoft.com/office/powerpoint/2010/main" val="3648790277"/>
+      </p:ext>
+    </p:extLst>
+  </p:cSld>
+  <p:clrMapOvr>
+    <a:masterClrMapping/>
+  </p:clrMapOvr>
+</p:notes>
+</file>
+
+<file path=ppt/notesSlides/notesSlide11.xml><?xml version="1.0" encoding="utf-8"?>
+<p:notes xmlns:a="http://schemas.openxmlformats.org/drawingml/2006/main" xmlns:r="http://schemas.openxmlformats.org/officeDocument/2006/relationships" xmlns:p="http://schemas.openxmlformats.org/presentationml/2006/main">
+  <p:cSld>
+    <p:spTree>
+      <p:nvGrpSpPr>
+        <p:cNvPr id="1" name=""/>
+        <p:cNvGrpSpPr/>
+        <p:nvPr/>
+      </p:nvGrpSpPr>
+      <p:grpSpPr>
+        <a:xfrm>
+          <a:off x="0" y="0"/>
+          <a:ext cx="0" cy="0"/>
+          <a:chOff x="0" y="0"/>
+          <a:chExt cx="0" cy="0"/>
+        </a:xfrm>
+      </p:grpSpPr>
+      <p:sp>
+        <p:nvSpPr>
+          <p:cNvPr id="2" name="Slide Image Placeholder 1"/>
+          <p:cNvSpPr>
+            <a:spLocks noGrp="1" noRot="1" noChangeAspect="1"/>
+          </p:cNvSpPr>
+          <p:nvPr>
+            <p:ph type="sldImg"/>
+          </p:nvPr>
+        </p:nvSpPr>
+        <p:spPr/>
+      </p:sp>
+      <p:sp>
+        <p:nvSpPr>
+          <p:cNvPr id="3" name="Notes Placeholder 2"/>
+          <p:cNvSpPr>
+            <a:spLocks noGrp="1"/>
+          </p:cNvSpPr>
+          <p:nvPr>
+            <p:ph type="body" idx="1"/>
+          </p:nvPr>
+        </p:nvSpPr>
+        <p:spPr/>
+        <p:txBody>
+          <a:bodyPr/>
+          <a:lstStyle/>
+          <a:p>
+            <a:endParaRPr lang="en-US"/>
+          </a:p>
+        </p:txBody>
+      </p:sp>
+      <p:sp>
+        <p:nvSpPr>
+          <p:cNvPr id="4" name="Slide Number Placeholder 3"/>
+          <p:cNvSpPr>
+            <a:spLocks noGrp="1"/>
+          </p:cNvSpPr>
+          <p:nvPr>
+            <p:ph type="sldNum" sz="quarter" idx="10"/>
+          </p:nvPr>
+        </p:nvSpPr>
+        <p:spPr/>
+        <p:txBody>
+          <a:bodyPr/>
+          <a:lstStyle/>
+          <a:p>
+            <a:fld id="{80E5F7B1-A22B-4383-89B4-FA12AEED286C}" type="slidenum">
+              <a:rPr lang="en-US" smtClean="0"/>
+              <a:t>11</a:t>
+            </a:fld>
+            <a:endParaRPr lang="en-US"/>
+          </a:p>
+        </p:txBody>
+      </p:sp>
+    </p:spTree>
+    <p:extLst>
+      <p:ext uri="{BB962C8B-B14F-4D97-AF65-F5344CB8AC3E}">
+        <p14:creationId xmlns:p14="http://schemas.microsoft.com/office/powerpoint/2010/main" val="164167437"/>
+      </p:ext>
+    </p:extLst>
+  </p:cSld>
+  <p:clrMapOvr>
+    <a:masterClrMapping/>
+  </p:clrMapOvr>
+</p:notes>
+</file>
+
 <file path=ppt/notesSlides/notesSlide2.xml><?xml version="1.0" encoding="utf-8"?>
 <p:notes xmlns:a="http://schemas.openxmlformats.org/drawingml/2006/main" xmlns:r="http://schemas.openxmlformats.org/officeDocument/2006/relationships" xmlns:p="http://schemas.openxmlformats.org/presentationml/2006/main">
   <p:cSld>
@@ -1346,6 +1517,90 @@
     <p:extLst>
       <p:ext uri="{BB962C8B-B14F-4D97-AF65-F5344CB8AC3E}">
         <p14:creationId xmlns:p14="http://schemas.microsoft.com/office/powerpoint/2010/main" val="609598564"/>
+      </p:ext>
+    </p:extLst>
+  </p:cSld>
+  <p:clrMapOvr>
+    <a:masterClrMapping/>
+  </p:clrMapOvr>
+</p:notes>
+</file>
+
+<file path=ppt/notesSlides/notesSlide9.xml><?xml version="1.0" encoding="utf-8"?>
+<p:notes xmlns:a="http://schemas.openxmlformats.org/drawingml/2006/main" xmlns:r="http://schemas.openxmlformats.org/officeDocument/2006/relationships" xmlns:p="http://schemas.openxmlformats.org/presentationml/2006/main">
+  <p:cSld>
+    <p:spTree>
+      <p:nvGrpSpPr>
+        <p:cNvPr id="1" name=""/>
+        <p:cNvGrpSpPr/>
+        <p:nvPr/>
+      </p:nvGrpSpPr>
+      <p:grpSpPr>
+        <a:xfrm>
+          <a:off x="0" y="0"/>
+          <a:ext cx="0" cy="0"/>
+          <a:chOff x="0" y="0"/>
+          <a:chExt cx="0" cy="0"/>
+        </a:xfrm>
+      </p:grpSpPr>
+      <p:sp>
+        <p:nvSpPr>
+          <p:cNvPr id="2" name="Slide Image Placeholder 1"/>
+          <p:cNvSpPr>
+            <a:spLocks noGrp="1" noRot="1" noChangeAspect="1"/>
+          </p:cNvSpPr>
+          <p:nvPr>
+            <p:ph type="sldImg"/>
+          </p:nvPr>
+        </p:nvSpPr>
+        <p:spPr/>
+      </p:sp>
+      <p:sp>
+        <p:nvSpPr>
+          <p:cNvPr id="3" name="Notes Placeholder 2"/>
+          <p:cNvSpPr>
+            <a:spLocks noGrp="1"/>
+          </p:cNvSpPr>
+          <p:nvPr>
+            <p:ph type="body" idx="1"/>
+          </p:nvPr>
+        </p:nvSpPr>
+        <p:spPr/>
+        <p:txBody>
+          <a:bodyPr/>
+          <a:lstStyle/>
+          <a:p>
+            <a:endParaRPr lang="en-US"/>
+          </a:p>
+        </p:txBody>
+      </p:sp>
+      <p:sp>
+        <p:nvSpPr>
+          <p:cNvPr id="4" name="Slide Number Placeholder 3"/>
+          <p:cNvSpPr>
+            <a:spLocks noGrp="1"/>
+          </p:cNvSpPr>
+          <p:nvPr>
+            <p:ph type="sldNum" sz="quarter" idx="10"/>
+          </p:nvPr>
+        </p:nvSpPr>
+        <p:spPr/>
+        <p:txBody>
+          <a:bodyPr/>
+          <a:lstStyle/>
+          <a:p>
+            <a:fld id="{80E5F7B1-A22B-4383-89B4-FA12AEED286C}" type="slidenum">
+              <a:rPr lang="en-US" smtClean="0"/>
+              <a:t>9</a:t>
+            </a:fld>
+            <a:endParaRPr lang="en-US"/>
+          </a:p>
+        </p:txBody>
+      </p:sp>
+    </p:spTree>
+    <p:extLst>
+      <p:ext uri="{BB962C8B-B14F-4D97-AF65-F5344CB8AC3E}">
+        <p14:creationId xmlns:p14="http://schemas.microsoft.com/office/powerpoint/2010/main" val="4264596322"/>
       </p:ext>
     </p:extLst>
   </p:cSld>
@@ -9950,6 +10205,507 @@
 </p:sld>
 </file>
 
+<file path=ppt/slides/slide10.xml><?xml version="1.0" encoding="utf-8"?>
+<p:sld xmlns:a="http://schemas.openxmlformats.org/drawingml/2006/main" xmlns:r="http://schemas.openxmlformats.org/officeDocument/2006/relationships" xmlns:p="http://schemas.openxmlformats.org/presentationml/2006/main">
+  <p:cSld>
+    <p:spTree>
+      <p:nvGrpSpPr>
+        <p:cNvPr id="1" name=""/>
+        <p:cNvGrpSpPr/>
+        <p:nvPr/>
+      </p:nvGrpSpPr>
+      <p:grpSpPr>
+        <a:xfrm>
+          <a:off x="0" y="0"/>
+          <a:ext cx="0" cy="0"/>
+          <a:chOff x="0" y="0"/>
+          <a:chExt cx="0" cy="0"/>
+        </a:xfrm>
+      </p:grpSpPr>
+      <p:sp>
+        <p:nvSpPr>
+          <p:cNvPr id="2" name="Title 1"/>
+          <p:cNvSpPr>
+            <a:spLocks noGrp="1"/>
+          </p:cNvSpPr>
+          <p:nvPr>
+            <p:ph type="title"/>
+          </p:nvPr>
+        </p:nvSpPr>
+        <p:spPr>
+          <a:xfrm>
+            <a:off x="519248" y="543951"/>
+            <a:ext cx="11151917" cy="692497"/>
+          </a:xfrm>
+        </p:spPr>
+        <p:txBody>
+          <a:bodyPr/>
+          <a:lstStyle/>
+          <a:p>
+            <a:r>
+              <a:rPr lang="en-US" sz="5000" dirty="0"/>
+              <a:t>Creating</a:t>
+            </a:r>
+            <a:r>
+              <a:rPr lang="ko-KR" altLang="en-US" sz="5000" dirty="0"/>
+              <a:t> </a:t>
+            </a:r>
+            <a:r>
+              <a:rPr lang="en-US" altLang="ko-KR" sz="5000" dirty="0"/>
+              <a:t>a</a:t>
+            </a:r>
+            <a:r>
+              <a:rPr lang="ko-KR" altLang="en-US" sz="5000" dirty="0"/>
+              <a:t> </a:t>
+            </a:r>
+            <a:r>
+              <a:rPr lang="en-US" altLang="ko-KR" sz="5000" dirty="0"/>
+              <a:t>Vulkan Instance</a:t>
+            </a:r>
+            <a:endParaRPr lang="en-US" sz="5000" dirty="0"/>
+          </a:p>
+        </p:txBody>
+      </p:sp>
+      <p:sp>
+        <p:nvSpPr>
+          <p:cNvPr id="4" name="Slide Number Placeholder 3"/>
+          <p:cNvSpPr>
+            <a:spLocks noGrp="1"/>
+          </p:cNvSpPr>
+          <p:nvPr>
+            <p:ph type="sldNum" sz="quarter" idx="4"/>
+          </p:nvPr>
+        </p:nvSpPr>
+        <p:spPr/>
+        <p:txBody>
+          <a:bodyPr/>
+          <a:lstStyle/>
+          <a:p>
+            <a:fld id="{6B5C536E-FA7B-40DC-A296-D7EC18490057}" type="slidenum">
+              <a:rPr lang="ko-KR" altLang="en-US" smtClean="0"/>
+              <a:pPr/>
+              <a:t>10</a:t>
+            </a:fld>
+            <a:endParaRPr lang="ko-KR" altLang="en-US"/>
+          </a:p>
+        </p:txBody>
+      </p:sp>
+      <p:sp>
+        <p:nvSpPr>
+          <p:cNvPr id="8" name="Text Placeholder 2">
+            <a:extLst>
+              <a:ext uri="{FF2B5EF4-FFF2-40B4-BE49-F238E27FC236}">
+                <a16:creationId xmlns:a16="http://schemas.microsoft.com/office/drawing/2014/main" id="{F28E7A55-1C36-47EF-9A9E-93310F276501}"/>
+              </a:ext>
+            </a:extLst>
+          </p:cNvPr>
+          <p:cNvSpPr>
+            <a:spLocks noGrp="1"/>
+          </p:cNvSpPr>
+          <p:nvPr>
+            <p:ph type="body" sz="quarter" idx="10"/>
+          </p:nvPr>
+        </p:nvSpPr>
+        <p:spPr>
+          <a:xfrm>
+            <a:off x="519248" y="1447801"/>
+            <a:ext cx="11151917" cy="4944532"/>
+          </a:xfrm>
+        </p:spPr>
+        <p:txBody>
+          <a:bodyPr>
+            <a:normAutofit/>
+          </a:bodyPr>
+          <a:lstStyle/>
+          <a:p>
+            <a:pPr>
+              <a:lnSpc>
+                <a:spcPct val="100000"/>
+              </a:lnSpc>
+            </a:pPr>
+            <a:r>
+              <a:rPr lang="en-US" altLang="ko-KR" dirty="0">
+                <a:latin typeface="서울남산체 M" panose="02020603020101020101" pitchFamily="18" charset="-127"/>
+                <a:ea typeface="서울남산체 M" panose="02020603020101020101" pitchFamily="18" charset="-127"/>
+              </a:rPr>
+              <a:t>Vulkan </a:t>
+            </a:r>
+            <a:r>
+              <a:rPr lang="ko-KR" altLang="en-US" dirty="0">
+                <a:latin typeface="서울남산체 M" panose="02020603020101020101" pitchFamily="18" charset="-127"/>
+                <a:ea typeface="서울남산체 M" panose="02020603020101020101" pitchFamily="18" charset="-127"/>
+              </a:rPr>
+              <a:t>인스턴스는 애플리케이션의 상태를 수집하는 개체</a:t>
+            </a:r>
+            <a:endParaRPr lang="en-US" altLang="ko-KR" dirty="0">
+              <a:latin typeface="서울남산체 M" panose="02020603020101020101" pitchFamily="18" charset="-127"/>
+              <a:ea typeface="서울남산체 M" panose="02020603020101020101" pitchFamily="18" charset="-127"/>
+            </a:endParaRPr>
+          </a:p>
+          <a:p>
+            <a:pPr lvl="1">
+              <a:lnSpc>
+                <a:spcPct val="100000"/>
+              </a:lnSpc>
+            </a:pPr>
+            <a:r>
+              <a:rPr lang="ko-KR" altLang="en-US" dirty="0">
+                <a:latin typeface="서울남산체 M" panose="02020603020101020101" pitchFamily="18" charset="-127"/>
+                <a:ea typeface="서울남산체 M" panose="02020603020101020101" pitchFamily="18" charset="-127"/>
+              </a:rPr>
+              <a:t>애플리케이션 이름</a:t>
+            </a:r>
+            <a:r>
+              <a:rPr lang="en-US" altLang="ko-KR" dirty="0">
+                <a:latin typeface="서울남산체 M" panose="02020603020101020101" pitchFamily="18" charset="-127"/>
+                <a:ea typeface="서울남산체 M" panose="02020603020101020101" pitchFamily="18" charset="-127"/>
+              </a:rPr>
+              <a:t>, </a:t>
+            </a:r>
+            <a:r>
+              <a:rPr lang="ko-KR" altLang="en-US" dirty="0">
+                <a:latin typeface="서울남산체 M" panose="02020603020101020101" pitchFamily="18" charset="-127"/>
+                <a:ea typeface="서울남산체 M" panose="02020603020101020101" pitchFamily="18" charset="-127"/>
+              </a:rPr>
+              <a:t>애플리케이션을 만드는 데 사용하는 엔진의 이름 및 버전</a:t>
+            </a:r>
+            <a:br>
+              <a:rPr lang="en-US" altLang="ko-KR" dirty="0">
+                <a:latin typeface="서울남산체 M" panose="02020603020101020101" pitchFamily="18" charset="-127"/>
+                <a:ea typeface="서울남산체 M" panose="02020603020101020101" pitchFamily="18" charset="-127"/>
+              </a:rPr>
+            </a:br>
+            <a:r>
+              <a:rPr lang="ko-KR" altLang="en-US" dirty="0">
+                <a:latin typeface="서울남산체 M" panose="02020603020101020101" pitchFamily="18" charset="-127"/>
+                <a:ea typeface="서울남산체 M" panose="02020603020101020101" pitchFamily="18" charset="-127"/>
+              </a:rPr>
+              <a:t>또는 인스턴스 레벨 확장명 및 계층을 사용할 수 있는 정보</a:t>
+            </a:r>
+            <a:r>
+              <a:rPr lang="en-US" altLang="ko-KR" dirty="0">
+                <a:latin typeface="서울남산체 M" panose="02020603020101020101" pitchFamily="18" charset="-127"/>
+                <a:ea typeface="서울남산체 M" panose="02020603020101020101" pitchFamily="18" charset="-127"/>
+              </a:rPr>
+              <a:t> </a:t>
+            </a:r>
+            <a:r>
+              <a:rPr lang="ko-KR" altLang="en-US" dirty="0">
+                <a:latin typeface="서울남산체 M" panose="02020603020101020101" pitchFamily="18" charset="-127"/>
+                <a:ea typeface="서울남산체 M" panose="02020603020101020101" pitchFamily="18" charset="-127"/>
+              </a:rPr>
+              <a:t>등을 포함</a:t>
+            </a:r>
+            <a:endParaRPr lang="en-US" altLang="ko-KR" dirty="0">
+              <a:latin typeface="서울남산체 M" panose="02020603020101020101" pitchFamily="18" charset="-127"/>
+              <a:ea typeface="서울남산체 M" panose="02020603020101020101" pitchFamily="18" charset="-127"/>
+            </a:endParaRPr>
+          </a:p>
+          <a:p>
+            <a:pPr lvl="1">
+              <a:lnSpc>
+                <a:spcPct val="100000"/>
+              </a:lnSpc>
+            </a:pPr>
+            <a:r>
+              <a:rPr lang="en-US" altLang="ko-KR" dirty="0">
+                <a:latin typeface="서울남산체 M" panose="02020603020101020101" pitchFamily="18" charset="-127"/>
+                <a:ea typeface="서울남산체 M" panose="02020603020101020101" pitchFamily="18" charset="-127"/>
+              </a:rPr>
+              <a:t>Instance</a:t>
+            </a:r>
+            <a:r>
+              <a:rPr lang="ko-KR" altLang="en-US" dirty="0">
+                <a:latin typeface="서울남산체 M" panose="02020603020101020101" pitchFamily="18" charset="-127"/>
+                <a:ea typeface="서울남산체 M" panose="02020603020101020101" pitchFamily="18" charset="-127"/>
+              </a:rPr>
+              <a:t>를 통해 사용 가능한 물리적 디바이스를 나열하고 이미지 생성이나</a:t>
+            </a:r>
+            <a:br>
+              <a:rPr lang="en-US" altLang="ko-KR" dirty="0">
+                <a:latin typeface="서울남산체 M" panose="02020603020101020101" pitchFamily="18" charset="-127"/>
+                <a:ea typeface="서울남산체 M" panose="02020603020101020101" pitchFamily="18" charset="-127"/>
+              </a:rPr>
+            </a:br>
+            <a:r>
+              <a:rPr lang="ko-KR" altLang="en-US" dirty="0">
+                <a:latin typeface="서울남산체 M" panose="02020603020101020101" pitchFamily="18" charset="-127"/>
+                <a:ea typeface="서울남산체 M" panose="02020603020101020101" pitchFamily="18" charset="-127"/>
+              </a:rPr>
+              <a:t>그리기처럼 일반적인 작업을 수행하는 논리 디바이스를 만들 수 있음</a:t>
+            </a:r>
+            <a:endParaRPr lang="en-US" altLang="ko-KR" dirty="0">
+              <a:latin typeface="서울남산체 M" panose="02020603020101020101" pitchFamily="18" charset="-127"/>
+              <a:ea typeface="서울남산체 M" panose="02020603020101020101" pitchFamily="18" charset="-127"/>
+            </a:endParaRPr>
+          </a:p>
+          <a:p>
+            <a:pPr lvl="1">
+              <a:lnSpc>
+                <a:spcPct val="100000"/>
+              </a:lnSpc>
+            </a:pPr>
+            <a:r>
+              <a:rPr lang="ko-KR" altLang="en-US" dirty="0">
+                <a:latin typeface="서울남산체 M" panose="02020603020101020101" pitchFamily="18" charset="-127"/>
+                <a:ea typeface="서울남산체 M" panose="02020603020101020101" pitchFamily="18" charset="-127"/>
+              </a:rPr>
+              <a:t>따라서 </a:t>
+            </a:r>
+            <a:r>
+              <a:rPr lang="en-US" altLang="ko-KR" dirty="0">
+                <a:latin typeface="서울남산체 M" panose="02020603020101020101" pitchFamily="18" charset="-127"/>
+                <a:ea typeface="서울남산체 M" panose="02020603020101020101" pitchFamily="18" charset="-127"/>
+              </a:rPr>
+              <a:t>Vulkan API</a:t>
+            </a:r>
+            <a:r>
+              <a:rPr lang="ko-KR" altLang="en-US" dirty="0">
+                <a:latin typeface="서울남산체 M" panose="02020603020101020101" pitchFamily="18" charset="-127"/>
+                <a:ea typeface="서울남산체 M" panose="02020603020101020101" pitchFamily="18" charset="-127"/>
+              </a:rPr>
+              <a:t>를 사용하기 전에 새 </a:t>
+            </a:r>
+            <a:r>
+              <a:rPr lang="en-US" altLang="ko-KR" dirty="0">
+                <a:latin typeface="서울남산체 M" panose="02020603020101020101" pitchFamily="18" charset="-127"/>
+                <a:ea typeface="서울남산체 M" panose="02020603020101020101" pitchFamily="18" charset="-127"/>
+              </a:rPr>
+              <a:t>Instance </a:t>
+            </a:r>
+            <a:r>
+              <a:rPr lang="ko-KR" altLang="en-US" dirty="0">
+                <a:latin typeface="서울남산체 M" panose="02020603020101020101" pitchFamily="18" charset="-127"/>
+                <a:ea typeface="서울남산체 M" panose="02020603020101020101" pitchFamily="18" charset="-127"/>
+              </a:rPr>
+              <a:t>개체를 만들어야 함</a:t>
+            </a:r>
+            <a:endParaRPr lang="en-US" altLang="ko-KR" dirty="0">
+              <a:latin typeface="서울남산체 M" panose="02020603020101020101" pitchFamily="18" charset="-127"/>
+              <a:ea typeface="서울남산체 M" panose="02020603020101020101" pitchFamily="18" charset="-127"/>
+            </a:endParaRPr>
+          </a:p>
+        </p:txBody>
+      </p:sp>
+    </p:spTree>
+    <p:extLst>
+      <p:ext uri="{BB962C8B-B14F-4D97-AF65-F5344CB8AC3E}">
+        <p14:creationId xmlns:p14="http://schemas.microsoft.com/office/powerpoint/2010/main" val="144433268"/>
+      </p:ext>
+    </p:extLst>
+  </p:cSld>
+  <p:clrMapOvr>
+    <a:masterClrMapping/>
+  </p:clrMapOvr>
+  <mc:AlternateContent xmlns:mc="http://schemas.openxmlformats.org/markup-compatibility/2006" xmlns:p14="http://schemas.microsoft.com/office/powerpoint/2010/main">
+    <mc:Choice Requires="p14">
+      <p:transition p14:dur="0"/>
+    </mc:Choice>
+    <mc:Fallback xmlns="">
+      <p:transition/>
+    </mc:Fallback>
+  </mc:AlternateContent>
+</p:sld>
+</file>
+
+<file path=ppt/slides/slide11.xml><?xml version="1.0" encoding="utf-8"?>
+<p:sld xmlns:a="http://schemas.openxmlformats.org/drawingml/2006/main" xmlns:r="http://schemas.openxmlformats.org/officeDocument/2006/relationships" xmlns:p="http://schemas.openxmlformats.org/presentationml/2006/main">
+  <p:cSld>
+    <p:spTree>
+      <p:nvGrpSpPr>
+        <p:cNvPr id="1" name=""/>
+        <p:cNvGrpSpPr/>
+        <p:nvPr/>
+      </p:nvGrpSpPr>
+      <p:grpSpPr>
+        <a:xfrm>
+          <a:off x="0" y="0"/>
+          <a:ext cx="0" cy="0"/>
+          <a:chOff x="0" y="0"/>
+          <a:chExt cx="0" cy="0"/>
+        </a:xfrm>
+      </p:grpSpPr>
+      <p:sp>
+        <p:nvSpPr>
+          <p:cNvPr id="2" name="Title 1"/>
+          <p:cNvSpPr>
+            <a:spLocks noGrp="1"/>
+          </p:cNvSpPr>
+          <p:nvPr>
+            <p:ph type="title"/>
+          </p:nvPr>
+        </p:nvSpPr>
+        <p:spPr>
+          <a:xfrm>
+            <a:off x="519248" y="543951"/>
+            <a:ext cx="11151917" cy="692497"/>
+          </a:xfrm>
+        </p:spPr>
+        <p:txBody>
+          <a:bodyPr/>
+          <a:lstStyle/>
+          <a:p>
+            <a:r>
+              <a:rPr lang="en-US" sz="5000" dirty="0"/>
+              <a:t>Loading</a:t>
+            </a:r>
+            <a:r>
+              <a:rPr lang="ko-KR" altLang="en-US" sz="5000" dirty="0"/>
+              <a:t> </a:t>
+            </a:r>
+            <a:r>
+              <a:rPr lang="en-US" altLang="ko-KR" sz="5000" dirty="0"/>
+              <a:t>instance-level</a:t>
+            </a:r>
+            <a:r>
+              <a:rPr lang="ko-KR" altLang="en-US" sz="5000" dirty="0"/>
+              <a:t> </a:t>
+            </a:r>
+            <a:r>
+              <a:rPr lang="en-US" altLang="ko-KR" sz="5000" dirty="0"/>
+              <a:t>functions</a:t>
+            </a:r>
+            <a:endParaRPr lang="en-US" sz="5000" dirty="0"/>
+          </a:p>
+        </p:txBody>
+      </p:sp>
+      <p:sp>
+        <p:nvSpPr>
+          <p:cNvPr id="4" name="Slide Number Placeholder 3"/>
+          <p:cNvSpPr>
+            <a:spLocks noGrp="1"/>
+          </p:cNvSpPr>
+          <p:nvPr>
+            <p:ph type="sldNum" sz="quarter" idx="4"/>
+          </p:nvPr>
+        </p:nvSpPr>
+        <p:spPr/>
+        <p:txBody>
+          <a:bodyPr/>
+          <a:lstStyle/>
+          <a:p>
+            <a:fld id="{6B5C536E-FA7B-40DC-A296-D7EC18490057}" type="slidenum">
+              <a:rPr lang="ko-KR" altLang="en-US" smtClean="0"/>
+              <a:pPr/>
+              <a:t>11</a:t>
+            </a:fld>
+            <a:endParaRPr lang="ko-KR" altLang="en-US"/>
+          </a:p>
+        </p:txBody>
+      </p:sp>
+      <p:sp>
+        <p:nvSpPr>
+          <p:cNvPr id="8" name="Text Placeholder 2">
+            <a:extLst>
+              <a:ext uri="{FF2B5EF4-FFF2-40B4-BE49-F238E27FC236}">
+                <a16:creationId xmlns:a16="http://schemas.microsoft.com/office/drawing/2014/main" id="{F28E7A55-1C36-47EF-9A9E-93310F276501}"/>
+              </a:ext>
+            </a:extLst>
+          </p:cNvPr>
+          <p:cNvSpPr>
+            <a:spLocks noGrp="1"/>
+          </p:cNvSpPr>
+          <p:nvPr>
+            <p:ph type="body" sz="quarter" idx="10"/>
+          </p:nvPr>
+        </p:nvSpPr>
+        <p:spPr>
+          <a:xfrm>
+            <a:off x="519248" y="1447801"/>
+            <a:ext cx="11151917" cy="4944532"/>
+          </a:xfrm>
+        </p:spPr>
+        <p:txBody>
+          <a:bodyPr>
+            <a:normAutofit/>
+          </a:bodyPr>
+          <a:lstStyle/>
+          <a:p>
+            <a:pPr>
+              <a:lnSpc>
+                <a:spcPct val="100000"/>
+              </a:lnSpc>
+            </a:pPr>
+            <a:r>
+              <a:rPr lang="ko-KR" altLang="en-US" dirty="0">
+                <a:latin typeface="서울남산체 M" panose="02020603020101020101" pitchFamily="18" charset="-127"/>
+                <a:ea typeface="서울남산체 M" panose="02020603020101020101" pitchFamily="18" charset="-127"/>
+              </a:rPr>
+              <a:t>다음 단계는 물리적 디바이스를 나열하고 그 중 하나를 선택한 뒤</a:t>
+            </a:r>
+            <a:br>
+              <a:rPr lang="en-US" altLang="ko-KR" dirty="0">
+                <a:latin typeface="서울남산체 M" panose="02020603020101020101" pitchFamily="18" charset="-127"/>
+                <a:ea typeface="서울남산체 M" panose="02020603020101020101" pitchFamily="18" charset="-127"/>
+              </a:rPr>
+            </a:br>
+            <a:r>
+              <a:rPr lang="ko-KR" altLang="en-US" dirty="0">
+                <a:latin typeface="서울남산체 M" panose="02020603020101020101" pitchFamily="18" charset="-127"/>
+                <a:ea typeface="서울남산체 M" panose="02020603020101020101" pitchFamily="18" charset="-127"/>
+              </a:rPr>
+              <a:t>해당 디바이스에서 논리적 디바이스를 만드는 작업</a:t>
+            </a:r>
+            <a:endParaRPr lang="en-US" altLang="ko-KR" dirty="0">
+              <a:latin typeface="서울남산체 M" panose="02020603020101020101" pitchFamily="18" charset="-127"/>
+              <a:ea typeface="서울남산체 M" panose="02020603020101020101" pitchFamily="18" charset="-127"/>
+            </a:endParaRPr>
+          </a:p>
+          <a:p>
+            <a:pPr lvl="1">
+              <a:lnSpc>
+                <a:spcPct val="100000"/>
+              </a:lnSpc>
+            </a:pPr>
+            <a:r>
+              <a:rPr lang="ko-KR" altLang="en-US" dirty="0">
+                <a:latin typeface="서울남산체 M" panose="02020603020101020101" pitchFamily="18" charset="-127"/>
+                <a:ea typeface="서울남산체 M" panose="02020603020101020101" pitchFamily="18" charset="-127"/>
+              </a:rPr>
+              <a:t>인스턴스 수준의 함수를 사용해 주소를 가져와야</a:t>
+            </a:r>
+            <a:r>
+              <a:rPr lang="en-US" altLang="ko-KR" dirty="0">
+                <a:latin typeface="서울남산체 M" panose="02020603020101020101" pitchFamily="18" charset="-127"/>
+                <a:ea typeface="서울남산체 M" panose="02020603020101020101" pitchFamily="18" charset="-127"/>
+              </a:rPr>
+              <a:t> </a:t>
+            </a:r>
+            <a:r>
+              <a:rPr lang="ko-KR" altLang="en-US" dirty="0">
+                <a:latin typeface="서울남산체 M" panose="02020603020101020101" pitchFamily="18" charset="-127"/>
+                <a:ea typeface="서울남산체 M" panose="02020603020101020101" pitchFamily="18" charset="-127"/>
+              </a:rPr>
+              <a:t>함</a:t>
+            </a:r>
+            <a:endParaRPr lang="en-US" altLang="ko-KR" dirty="0">
+              <a:latin typeface="서울남산체 M" panose="02020603020101020101" pitchFamily="18" charset="-127"/>
+              <a:ea typeface="서울남산체 M" panose="02020603020101020101" pitchFamily="18" charset="-127"/>
+            </a:endParaRPr>
+          </a:p>
+        </p:txBody>
+      </p:sp>
+    </p:spTree>
+    <p:extLst>
+      <p:ext uri="{BB962C8B-B14F-4D97-AF65-F5344CB8AC3E}">
+        <p14:creationId xmlns:p14="http://schemas.microsoft.com/office/powerpoint/2010/main" val="3929305509"/>
+      </p:ext>
+    </p:extLst>
+  </p:cSld>
+  <p:clrMapOvr>
+    <a:masterClrMapping/>
+  </p:clrMapOvr>
+  <mc:AlternateContent xmlns:mc="http://schemas.openxmlformats.org/markup-compatibility/2006" xmlns:p14="http://schemas.microsoft.com/office/powerpoint/2010/main">
+    <mc:Choice Requires="p14">
+      <p:transition p14:dur="0"/>
+    </mc:Choice>
+    <mc:Fallback xmlns="">
+      <p:transition/>
+    </mc:Fallback>
+  </mc:AlternateContent>
+</p:sld>
+</file>
+
 <file path=ppt/slides/slide2.xml><?xml version="1.0" encoding="utf-8"?>
 <p:sld xmlns:a="http://schemas.openxmlformats.org/drawingml/2006/main" xmlns:r="http://schemas.openxmlformats.org/officeDocument/2006/relationships" xmlns:p="http://schemas.openxmlformats.org/presentationml/2006/main">
   <p:cSld>
@@ -12740,6 +13496,318 @@
     <p:extLst>
       <p:ext uri="{BB962C8B-B14F-4D97-AF65-F5344CB8AC3E}">
         <p14:creationId xmlns:p14="http://schemas.microsoft.com/office/powerpoint/2010/main" val="734262741"/>
+      </p:ext>
+    </p:extLst>
+  </p:cSld>
+  <p:clrMapOvr>
+    <a:masterClrMapping/>
+  </p:clrMapOvr>
+  <mc:AlternateContent xmlns:mc="http://schemas.openxmlformats.org/markup-compatibility/2006" xmlns:p14="http://schemas.microsoft.com/office/powerpoint/2010/main">
+    <mc:Choice Requires="p14">
+      <p:transition p14:dur="0"/>
+    </mc:Choice>
+    <mc:Fallback xmlns="">
+      <p:transition/>
+    </mc:Fallback>
+  </mc:AlternateContent>
+</p:sld>
+</file>
+
+<file path=ppt/slides/slide9.xml><?xml version="1.0" encoding="utf-8"?>
+<p:sld xmlns:a="http://schemas.openxmlformats.org/drawingml/2006/main" xmlns:r="http://schemas.openxmlformats.org/officeDocument/2006/relationships" xmlns:p="http://schemas.openxmlformats.org/presentationml/2006/main">
+  <p:cSld>
+    <p:spTree>
+      <p:nvGrpSpPr>
+        <p:cNvPr id="1" name=""/>
+        <p:cNvGrpSpPr/>
+        <p:nvPr/>
+      </p:nvGrpSpPr>
+      <p:grpSpPr>
+        <a:xfrm>
+          <a:off x="0" y="0"/>
+          <a:ext cx="0" cy="0"/>
+          <a:chOff x="0" y="0"/>
+          <a:chExt cx="0" cy="0"/>
+        </a:xfrm>
+      </p:grpSpPr>
+      <p:sp>
+        <p:nvSpPr>
+          <p:cNvPr id="2" name="Title 1"/>
+          <p:cNvSpPr>
+            <a:spLocks noGrp="1"/>
+          </p:cNvSpPr>
+          <p:nvPr>
+            <p:ph type="title"/>
+          </p:nvPr>
+        </p:nvSpPr>
+        <p:spPr>
+          <a:xfrm>
+            <a:off x="519248" y="543951"/>
+            <a:ext cx="11151917" cy="692497"/>
+          </a:xfrm>
+        </p:spPr>
+        <p:txBody>
+          <a:bodyPr/>
+          <a:lstStyle/>
+          <a:p>
+            <a:r>
+              <a:rPr lang="en-US" sz="5000" dirty="0"/>
+              <a:t>Checking available Instance extensions</a:t>
+            </a:r>
+          </a:p>
+        </p:txBody>
+      </p:sp>
+      <p:sp>
+        <p:nvSpPr>
+          <p:cNvPr id="4" name="Slide Number Placeholder 3"/>
+          <p:cNvSpPr>
+            <a:spLocks noGrp="1"/>
+          </p:cNvSpPr>
+          <p:nvPr>
+            <p:ph type="sldNum" sz="quarter" idx="4"/>
+          </p:nvPr>
+        </p:nvSpPr>
+        <p:spPr/>
+        <p:txBody>
+          <a:bodyPr/>
+          <a:lstStyle/>
+          <a:p>
+            <a:fld id="{6B5C536E-FA7B-40DC-A296-D7EC18490057}" type="slidenum">
+              <a:rPr lang="ko-KR" altLang="en-US" smtClean="0"/>
+              <a:pPr/>
+              <a:t>9</a:t>
+            </a:fld>
+            <a:endParaRPr lang="ko-KR" altLang="en-US"/>
+          </a:p>
+        </p:txBody>
+      </p:sp>
+      <p:sp>
+        <p:nvSpPr>
+          <p:cNvPr id="8" name="Text Placeholder 2">
+            <a:extLst>
+              <a:ext uri="{FF2B5EF4-FFF2-40B4-BE49-F238E27FC236}">
+                <a16:creationId xmlns:a16="http://schemas.microsoft.com/office/drawing/2014/main" id="{F28E7A55-1C36-47EF-9A9E-93310F276501}"/>
+              </a:ext>
+            </a:extLst>
+          </p:cNvPr>
+          <p:cNvSpPr>
+            <a:spLocks noGrp="1"/>
+          </p:cNvSpPr>
+          <p:nvPr>
+            <p:ph type="body" sz="quarter" idx="10"/>
+          </p:nvPr>
+        </p:nvSpPr>
+        <p:spPr>
+          <a:xfrm>
+            <a:off x="519248" y="1447801"/>
+            <a:ext cx="11151917" cy="4944532"/>
+          </a:xfrm>
+        </p:spPr>
+        <p:txBody>
+          <a:bodyPr>
+            <a:normAutofit/>
+          </a:bodyPr>
+          <a:lstStyle/>
+          <a:p>
+            <a:pPr>
+              <a:lnSpc>
+                <a:spcPct val="100000"/>
+              </a:lnSpc>
+            </a:pPr>
+            <a:r>
+              <a:rPr lang="en-US" altLang="ko-KR" dirty="0">
+                <a:latin typeface="서울남산체 M" panose="02020603020101020101" pitchFamily="18" charset="-127"/>
+                <a:ea typeface="서울남산체 M" panose="02020603020101020101" pitchFamily="18" charset="-127"/>
+              </a:rPr>
+              <a:t>Vulkan </a:t>
+            </a:r>
+            <a:r>
+              <a:rPr lang="ko-KR" altLang="en-US" dirty="0">
+                <a:latin typeface="서울남산체 M" panose="02020603020101020101" pitchFamily="18" charset="-127"/>
+                <a:ea typeface="서울남산체 M" panose="02020603020101020101" pitchFamily="18" charset="-127"/>
+              </a:rPr>
+              <a:t>인스턴스는 애플리케이션 상태를 수집하고</a:t>
+            </a:r>
+            <a:br>
+              <a:rPr lang="en-US" altLang="ko-KR" dirty="0">
+                <a:latin typeface="서울남산체 M" panose="02020603020101020101" pitchFamily="18" charset="-127"/>
+                <a:ea typeface="서울남산체 M" panose="02020603020101020101" pitchFamily="18" charset="-127"/>
+              </a:rPr>
+            </a:br>
+            <a:r>
+              <a:rPr lang="ko-KR" altLang="en-US" dirty="0">
+                <a:latin typeface="서울남산체 M" panose="02020603020101020101" pitchFamily="18" charset="-127"/>
+                <a:ea typeface="서울남산체 M" panose="02020603020101020101" pitchFamily="18" charset="-127"/>
+              </a:rPr>
+              <a:t>거의 모든 작업을 수행하는 논리 디바이스를 만들 수 있음</a:t>
+            </a:r>
+            <a:endParaRPr lang="en-US" altLang="ko-KR" dirty="0">
+              <a:latin typeface="서울남산체 M" panose="02020603020101020101" pitchFamily="18" charset="-127"/>
+              <a:ea typeface="서울남산체 M" panose="02020603020101020101" pitchFamily="18" charset="-127"/>
+            </a:endParaRPr>
+          </a:p>
+          <a:p>
+            <a:pPr lvl="1">
+              <a:lnSpc>
+                <a:spcPct val="100000"/>
+              </a:lnSpc>
+            </a:pPr>
+            <a:r>
+              <a:rPr lang="en-US" altLang="ko-KR" dirty="0">
+                <a:latin typeface="서울남산체 M" panose="02020603020101020101" pitchFamily="18" charset="-127"/>
+                <a:ea typeface="서울남산체 M" panose="02020603020101020101" pitchFamily="18" charset="-127"/>
+              </a:rPr>
+              <a:t>Instance </a:t>
+            </a:r>
+            <a:r>
+              <a:rPr lang="ko-KR" altLang="en-US" dirty="0">
+                <a:latin typeface="서울남산체 M" panose="02020603020101020101" pitchFamily="18" charset="-127"/>
+                <a:ea typeface="서울남산체 M" panose="02020603020101020101" pitchFamily="18" charset="-127"/>
+              </a:rPr>
+              <a:t>개체를 만들려면 인스턴스 레벨 확장을 사용하도록 설정해야 함</a:t>
+            </a:r>
+            <a:endParaRPr lang="en-US" altLang="ko-KR" dirty="0">
+              <a:latin typeface="서울남산체 M" panose="02020603020101020101" pitchFamily="18" charset="-127"/>
+              <a:ea typeface="서울남산체 M" panose="02020603020101020101" pitchFamily="18" charset="-127"/>
+            </a:endParaRPr>
+          </a:p>
+          <a:p>
+            <a:pPr lvl="1">
+              <a:lnSpc>
+                <a:spcPct val="100000"/>
+              </a:lnSpc>
+            </a:pPr>
+            <a:r>
+              <a:rPr lang="ko-KR" altLang="en-US" dirty="0">
+                <a:latin typeface="서울남산체 M" panose="02020603020101020101" pitchFamily="18" charset="-127"/>
+                <a:ea typeface="서울남산체 M" panose="02020603020101020101" pitchFamily="18" charset="-127"/>
+              </a:rPr>
+              <a:t>가장 중요한 인스턴스 레벨 확장 중 하나의 예로는</a:t>
+            </a:r>
+            <a:br>
+              <a:rPr lang="en-US" altLang="ko-KR" dirty="0">
+                <a:latin typeface="서울남산체 M" panose="02020603020101020101" pitchFamily="18" charset="-127"/>
+                <a:ea typeface="서울남산체 M" panose="02020603020101020101" pitchFamily="18" charset="-127"/>
+              </a:rPr>
+            </a:br>
+            <a:r>
+              <a:rPr lang="ko-KR" altLang="en-US" dirty="0">
+                <a:latin typeface="서울남산체 M" panose="02020603020101020101" pitchFamily="18" charset="-127"/>
+                <a:ea typeface="서울남산체 M" panose="02020603020101020101" pitchFamily="18" charset="-127"/>
+              </a:rPr>
+              <a:t>화면에 이미지를 표시하는 데 사용되는 스왑 체인 관련 확장이 있음</a:t>
+            </a:r>
+            <a:endParaRPr lang="en-US" altLang="ko-KR" dirty="0">
+              <a:latin typeface="서울남산체 M" panose="02020603020101020101" pitchFamily="18" charset="-127"/>
+              <a:ea typeface="서울남산체 M" panose="02020603020101020101" pitchFamily="18" charset="-127"/>
+            </a:endParaRPr>
+          </a:p>
+          <a:p>
+            <a:pPr>
+              <a:lnSpc>
+                <a:spcPct val="100000"/>
+              </a:lnSpc>
+            </a:pPr>
+            <a:r>
+              <a:rPr lang="en-US" altLang="ko-KR" dirty="0">
+                <a:latin typeface="서울남산체 M" panose="02020603020101020101" pitchFamily="18" charset="-127"/>
+                <a:ea typeface="서울남산체 M" panose="02020603020101020101" pitchFamily="18" charset="-127"/>
+              </a:rPr>
+              <a:t>OpenGL</a:t>
+            </a:r>
+            <a:r>
+              <a:rPr lang="ko-KR" altLang="en-US" dirty="0">
+                <a:latin typeface="서울남산체 M" panose="02020603020101020101" pitchFamily="18" charset="-127"/>
+                <a:ea typeface="서울남산체 M" panose="02020603020101020101" pitchFamily="18" charset="-127"/>
+              </a:rPr>
+              <a:t>과 달리 </a:t>
+            </a:r>
+            <a:r>
+              <a:rPr lang="en-US" altLang="ko-KR" dirty="0">
+                <a:latin typeface="서울남산체 M" panose="02020603020101020101" pitchFamily="18" charset="-127"/>
+                <a:ea typeface="서울남산체 M" panose="02020603020101020101" pitchFamily="18" charset="-127"/>
+              </a:rPr>
+              <a:t>Vulkan</a:t>
+            </a:r>
+            <a:r>
+              <a:rPr lang="ko-KR" altLang="en-US" dirty="0">
+                <a:latin typeface="서울남산체 M" panose="02020603020101020101" pitchFamily="18" charset="-127"/>
+                <a:ea typeface="서울남산체 M" panose="02020603020101020101" pitchFamily="18" charset="-127"/>
+              </a:rPr>
+              <a:t>의 확장은 명시적으로 활성화됨</a:t>
+            </a:r>
+            <a:endParaRPr lang="en-US" altLang="ko-KR" dirty="0">
+              <a:latin typeface="서울남산체 M" panose="02020603020101020101" pitchFamily="18" charset="-127"/>
+              <a:ea typeface="서울남산체 M" panose="02020603020101020101" pitchFamily="18" charset="-127"/>
+            </a:endParaRPr>
+          </a:p>
+          <a:p>
+            <a:pPr lvl="1">
+              <a:lnSpc>
+                <a:spcPct val="100000"/>
+              </a:lnSpc>
+            </a:pPr>
+            <a:r>
+              <a:rPr lang="en-US" altLang="ko-KR" dirty="0">
+                <a:latin typeface="서울남산체 M" panose="02020603020101020101" pitchFamily="18" charset="-127"/>
+                <a:ea typeface="서울남산체 M" panose="02020603020101020101" pitchFamily="18" charset="-127"/>
+              </a:rPr>
+              <a:t>Vulkan </a:t>
+            </a:r>
+            <a:r>
+              <a:rPr lang="ko-KR" altLang="en-US" dirty="0">
+                <a:latin typeface="서울남산체 M" panose="02020603020101020101" pitchFamily="18" charset="-127"/>
+                <a:ea typeface="서울남산체 M" panose="02020603020101020101" pitchFamily="18" charset="-127"/>
+              </a:rPr>
+              <a:t>인스턴스를 생성하고 지원되지 않는 확장을 요청할 수 없음</a:t>
+            </a:r>
+            <a:endParaRPr lang="en-US" altLang="ko-KR" dirty="0">
+              <a:latin typeface="서울남산체 M" panose="02020603020101020101" pitchFamily="18" charset="-127"/>
+              <a:ea typeface="서울남산체 M" panose="02020603020101020101" pitchFamily="18" charset="-127"/>
+            </a:endParaRPr>
+          </a:p>
+          <a:p>
+            <a:pPr lvl="2">
+              <a:lnSpc>
+                <a:spcPct val="100000"/>
+              </a:lnSpc>
+            </a:pPr>
+            <a:r>
+              <a:rPr lang="ko-KR" altLang="en-US" dirty="0">
+                <a:latin typeface="서울남산체 M" panose="02020603020101020101" pitchFamily="18" charset="-127"/>
+                <a:ea typeface="서울남산체 M" panose="02020603020101020101" pitchFamily="18" charset="-127"/>
+              </a:rPr>
+              <a:t>인트턴스 생성 작업이 실패하기 때문</a:t>
+            </a:r>
+            <a:endParaRPr lang="en-US" altLang="ko-KR" dirty="0">
+              <a:latin typeface="서울남산체 M" panose="02020603020101020101" pitchFamily="18" charset="-127"/>
+              <a:ea typeface="서울남산체 M" panose="02020603020101020101" pitchFamily="18" charset="-127"/>
+            </a:endParaRPr>
+          </a:p>
+          <a:p>
+            <a:pPr lvl="1">
+              <a:lnSpc>
+                <a:spcPct val="100000"/>
+              </a:lnSpc>
+            </a:pPr>
+            <a:r>
+              <a:rPr lang="ko-KR" altLang="en-US" dirty="0">
+                <a:latin typeface="서울남산체 M" panose="02020603020101020101" pitchFamily="18" charset="-127"/>
+                <a:ea typeface="서울남산체 M" panose="02020603020101020101" pitchFamily="18" charset="-127"/>
+              </a:rPr>
+              <a:t>따라서 특정 하드웨어 플랫폼에서 어떤 확장을 지원하는지 확인해야 함</a:t>
+            </a:r>
+            <a:endParaRPr lang="en-US" altLang="ko-KR" dirty="0">
+              <a:latin typeface="서울남산체 M" panose="02020603020101020101" pitchFamily="18" charset="-127"/>
+              <a:ea typeface="서울남산체 M" panose="02020603020101020101" pitchFamily="18" charset="-127"/>
+            </a:endParaRPr>
+          </a:p>
+        </p:txBody>
+      </p:sp>
+    </p:spTree>
+    <p:extLst>
+      <p:ext uri="{BB962C8B-B14F-4D97-AF65-F5344CB8AC3E}">
+        <p14:creationId xmlns:p14="http://schemas.microsoft.com/office/powerpoint/2010/main" val="2728043473"/>
       </p:ext>
     </p:extLst>
   </p:cSld>

</xml_diff>